<commit_message>
added AAS lab details
</commit_message>
<xml_diff>
--- a/Slides/Azure_Analysis_Services/Azure Analysis Services.pptx
+++ b/Slides/Azure_Analysis_Services/Azure Analysis Services.pptx
@@ -273,7 +273,7 @@
           <a:p>
             <a:fld id="{8CE90313-3FDD-4205-BBCA-0B92C34EC100}" type="datetimeFigureOut">
               <a:rPr lang="en-IN" smtClean="0"/>
-              <a:t>13-01-2023</a:t>
+              <a:t>16-01-2023</a:t>
             </a:fld>
             <a:endParaRPr lang="en-IN"/>
           </a:p>
@@ -473,7 +473,7 @@
           <a:p>
             <a:fld id="{8CE90313-3FDD-4205-BBCA-0B92C34EC100}" type="datetimeFigureOut">
               <a:rPr lang="en-IN" smtClean="0"/>
-              <a:t>13-01-2023</a:t>
+              <a:t>16-01-2023</a:t>
             </a:fld>
             <a:endParaRPr lang="en-IN"/>
           </a:p>
@@ -683,7 +683,7 @@
           <a:p>
             <a:fld id="{8CE90313-3FDD-4205-BBCA-0B92C34EC100}" type="datetimeFigureOut">
               <a:rPr lang="en-IN" smtClean="0"/>
-              <a:t>13-01-2023</a:t>
+              <a:t>16-01-2023</a:t>
             </a:fld>
             <a:endParaRPr lang="en-IN"/>
           </a:p>
@@ -883,7 +883,7 @@
           <a:p>
             <a:fld id="{8CE90313-3FDD-4205-BBCA-0B92C34EC100}" type="datetimeFigureOut">
               <a:rPr lang="en-IN" smtClean="0"/>
-              <a:t>13-01-2023</a:t>
+              <a:t>16-01-2023</a:t>
             </a:fld>
             <a:endParaRPr lang="en-IN"/>
           </a:p>
@@ -1159,7 +1159,7 @@
           <a:p>
             <a:fld id="{8CE90313-3FDD-4205-BBCA-0B92C34EC100}" type="datetimeFigureOut">
               <a:rPr lang="en-IN" smtClean="0"/>
-              <a:t>13-01-2023</a:t>
+              <a:t>16-01-2023</a:t>
             </a:fld>
             <a:endParaRPr lang="en-IN"/>
           </a:p>
@@ -1427,7 +1427,7 @@
           <a:p>
             <a:fld id="{8CE90313-3FDD-4205-BBCA-0B92C34EC100}" type="datetimeFigureOut">
               <a:rPr lang="en-IN" smtClean="0"/>
-              <a:t>13-01-2023</a:t>
+              <a:t>16-01-2023</a:t>
             </a:fld>
             <a:endParaRPr lang="en-IN"/>
           </a:p>
@@ -1842,7 +1842,7 @@
           <a:p>
             <a:fld id="{8CE90313-3FDD-4205-BBCA-0B92C34EC100}" type="datetimeFigureOut">
               <a:rPr lang="en-IN" smtClean="0"/>
-              <a:t>13-01-2023</a:t>
+              <a:t>16-01-2023</a:t>
             </a:fld>
             <a:endParaRPr lang="en-IN"/>
           </a:p>
@@ -1984,7 +1984,7 @@
           <a:p>
             <a:fld id="{8CE90313-3FDD-4205-BBCA-0B92C34EC100}" type="datetimeFigureOut">
               <a:rPr lang="en-IN" smtClean="0"/>
-              <a:t>13-01-2023</a:t>
+              <a:t>16-01-2023</a:t>
             </a:fld>
             <a:endParaRPr lang="en-IN"/>
           </a:p>
@@ -2097,7 +2097,7 @@
           <a:p>
             <a:fld id="{8CE90313-3FDD-4205-BBCA-0B92C34EC100}" type="datetimeFigureOut">
               <a:rPr lang="en-IN" smtClean="0"/>
-              <a:t>13-01-2023</a:t>
+              <a:t>16-01-2023</a:t>
             </a:fld>
             <a:endParaRPr lang="en-IN"/>
           </a:p>
@@ -2410,7 +2410,7 @@
           <a:p>
             <a:fld id="{8CE90313-3FDD-4205-BBCA-0B92C34EC100}" type="datetimeFigureOut">
               <a:rPr lang="en-IN" smtClean="0"/>
-              <a:t>13-01-2023</a:t>
+              <a:t>16-01-2023</a:t>
             </a:fld>
             <a:endParaRPr lang="en-IN"/>
           </a:p>
@@ -2699,7 +2699,7 @@
           <a:p>
             <a:fld id="{8CE90313-3FDD-4205-BBCA-0B92C34EC100}" type="datetimeFigureOut">
               <a:rPr lang="en-IN" smtClean="0"/>
-              <a:t>13-01-2023</a:t>
+              <a:t>16-01-2023</a:t>
             </a:fld>
             <a:endParaRPr lang="en-IN"/>
           </a:p>
@@ -2942,7 +2942,7 @@
           <a:p>
             <a:fld id="{8CE90313-3FDD-4205-BBCA-0B92C34EC100}" type="datetimeFigureOut">
               <a:rPr lang="en-IN" smtClean="0"/>
-              <a:t>13-01-2023</a:t>
+              <a:t>16-01-2023</a:t>
             </a:fld>
             <a:endParaRPr lang="en-IN"/>
           </a:p>

</xml_diff>